<commit_message>
Add - PPT Changes
</commit_message>
<xml_diff>
--- a/Docs/Advanced Graphics – Physically Based Rendering.pptx
+++ b/Docs/Advanced Graphics – Physically Based Rendering.pptx
@@ -3525,7 +3525,7 @@
           <a:p>
             <a:r>
               <a:rPr lang="en-GB" sz="2000" dirty="0"/>
-              <a:t>Lighting plays an important role to bring realism in computer graphics. Without it, the digital world will look colourless boring and dull.</a:t>
+              <a:t>Lighting plays an important role to bring realism in computer graphics.</a:t>
             </a:r>
           </a:p>
           <a:p>
@@ -3545,14 +3545,7 @@
             <a:pPr lvl="2"/>
             <a:r>
               <a:rPr lang="en-GB" sz="1400" dirty="0"/>
-              <a:t>Game level is divided into sectors.</a:t>
-            </a:r>
-          </a:p>
-          <a:p>
-            <a:pPr lvl="2"/>
-            <a:r>
-              <a:rPr lang="en-GB" sz="1400" dirty="0"/>
-              <a:t>Every sector had a light level with range 0-255. 0 being complete dark and 255 being very bright.</a:t>
+              <a:t>Game level is divided into sectors. Every sector had a light level with range 0-255. 0 being complete dark and 255 being very bright.</a:t>
             </a:r>
           </a:p>
           <a:p>
@@ -3577,14 +3570,7 @@
             <a:pPr lvl="2"/>
             <a:r>
               <a:rPr lang="en-GB" sz="1600" dirty="0"/>
-              <a:t>Sector area from player’s point of view is bright enough for player to see and slowly decreases as the distance between area and player increases.</a:t>
-            </a:r>
-          </a:p>
-          <a:p>
-            <a:pPr lvl="2"/>
-            <a:r>
-              <a:rPr lang="en-GB" sz="1600" dirty="0"/>
-              <a:t>Also used in simulating fog.</a:t>
+              <a:t>Sector area from player’s point of view is bright enough for player to see and slowly decreases as the distance between area and player increases. Also used in simulating fog.</a:t>
             </a:r>
           </a:p>
           <a:p>
@@ -3606,13 +3592,31 @@
             </a:r>
           </a:p>
           <a:p>
+            <a:pPr lvl="1"/>
+            <a:r>
+              <a:rPr lang="en-GB" sz="1600" dirty="0"/>
+              <a:t>Uses sum of three components: Ambient, Diffuse and Specular.</a:t>
+            </a:r>
+          </a:p>
+          <a:p>
             <a:r>
               <a:rPr lang="en-GB" sz="2000" dirty="0"/>
-              <a:t>Light Terminologies: Diffuse (Refraction) and Specular (Reflection)</a:t>
+              <a:t>Blinn-Phong light model disadvantages:</a:t>
             </a:r>
           </a:p>
           <a:p>
             <a:pPr lvl="1"/>
+            <a:r>
+              <a:rPr lang="en-GB" sz="1600" dirty="0"/>
+              <a:t>Violates conservation of energy law. Energy is lost as specular intensity is increased.</a:t>
+            </a:r>
+          </a:p>
+          <a:p>
+            <a:pPr lvl="1"/>
+            <a:r>
+              <a:rPr lang="en-GB" sz="1600" dirty="0"/>
+              <a:t>Doesn’t take the metallic and roughness surface properties on a microfacet level in account.</a:t>
+            </a:r>
             <a:endParaRPr lang="en-GB" sz="2000" dirty="0"/>
           </a:p>
         </p:txBody>
@@ -3670,79 +3674,148 @@
           </a:xfrm>
         </p:spPr>
         <p:txBody>
-          <a:bodyPr/>
+          <a:bodyPr>
+            <a:normAutofit lnSpcReduction="10000"/>
+          </a:bodyPr>
           <a:lstStyle/>
           <a:p>
             <a:r>
               <a:rPr lang="en-GB" sz="2000" dirty="0"/>
-              <a:t>Blinn-Phong light model problems:</a:t>
+              <a:t>Light Terminologies: Diffuse (Refraction) and Specular (Reflection)</a:t>
+            </a:r>
+          </a:p>
+          <a:p>
+            <a:r>
+              <a:rPr lang="en-GB" sz="2000" dirty="0"/>
+              <a:t>Physically-based Rendering (PBR):</a:t>
             </a:r>
           </a:p>
           <a:p>
             <a:pPr lvl="1"/>
             <a:r>
               <a:rPr lang="en-GB" sz="1600" dirty="0"/>
-              <a:t>Violates conservation of energy law. Energy is lost as specular intensity is increased.</a:t>
+              <a:t>Lighting equations in real-life are too complex and computationally expensive.</a:t>
             </a:r>
           </a:p>
           <a:p>
             <a:pPr lvl="1"/>
             <a:r>
               <a:rPr lang="en-GB" sz="1600" dirty="0"/>
-              <a:t>Doesn’t take the metallic and roughness surface properties on a microfacet level.</a:t>
+              <a:t>PBR is collection of techniques to bring light interactions in the real world physics approximation.</a:t>
             </a:r>
           </a:p>
           <a:p>
             <a:r>
               <a:rPr lang="en-GB" sz="2000" dirty="0"/>
-              <a:t>3D Games like Unreal, Doom 3 showcased more dynamic lighting with different light sources: Point, Directional, Spot Lights.</a:t>
+              <a:t>To do physical approximations, it needs to follow three rules:</a:t>
+            </a:r>
+          </a:p>
+          <a:p>
+            <a:pPr lvl="1"/>
+            <a:r>
+              <a:rPr lang="en-GB" sz="1600" dirty="0"/>
+              <a:t>Based on microfacet surface model.</a:t>
+            </a:r>
+          </a:p>
+          <a:p>
+            <a:pPr lvl="1"/>
+            <a:r>
+              <a:rPr lang="en-GB" sz="1600" dirty="0"/>
+              <a:t>Energy conserving – outgoing light reflected should not exceed incoming light.</a:t>
+            </a:r>
+          </a:p>
+          <a:p>
+            <a:pPr lvl="1"/>
+            <a:r>
+              <a:rPr lang="en-GB" sz="1600" dirty="0"/>
+              <a:t>Uses a physically based BRDF.</a:t>
             </a:r>
           </a:p>
           <a:p>
             <a:r>
               <a:rPr lang="en-GB" sz="2000" dirty="0"/>
-              <a:t>Different graphics API - OpenGL, DirectX introduced shaders and shading language which lets to do lighting, texture animation, etc.</a:t>
+              <a:t>Bidirectional reflective distribution function (BRDF):</a:t>
             </a:r>
           </a:p>
           <a:p>
             <a:pPr lvl="1"/>
             <a:r>
-              <a:rPr lang="en-GB" sz="1800" dirty="0"/>
-              <a:t>Lighting Model – the behaviour of interactions between surface and light source.</a:t>
+              <a:rPr lang="en-GB" sz="1600" dirty="0"/>
+              <a:t>Function that describes the reflectance properties of a the surface on a microfacet level.</a:t>
             </a:r>
           </a:p>
           <a:p>
             <a:pPr lvl="1"/>
             <a:r>
-              <a:rPr lang="en-GB" sz="1800" dirty="0"/>
-              <a:t>Shading Model – operation of calculating the final colour of a pixel.</a:t>
+              <a:rPr lang="en-GB" sz="1600" dirty="0"/>
+              <a:t>Takes the incoming light L, view direction V, surface normal N and surface roughness A as inputs.</a:t>
+            </a:r>
+          </a:p>
+          <a:p>
+            <a:pPr lvl="1"/>
+            <a:r>
+              <a:rPr lang="en-GB" sz="1600" dirty="0"/>
+              <a:t>It approximates how much light ray gets reflected based on the surface properties</a:t>
             </a:r>
           </a:p>
           <a:p>
             <a:r>
               <a:rPr lang="en-GB" sz="2000" dirty="0"/>
-              <a:t>Two types of light interactions: Diffuse (Refraction) and Specular (Reflection)</a:t>
+              <a:t>The most famous is the Cook-Torrance BRDF:</a:t>
             </a:r>
           </a:p>
           <a:p>
             <a:pPr lvl="1"/>
             <a:r>
-              <a:rPr lang="en-GB" sz="1800" dirty="0"/>
-              <a:t>Diffuse: Light gets refracted into the surface and moves out after several bounces.</a:t>
+              <a:rPr lang="en-GB" sz="1600" dirty="0"/>
+              <a:t>Fr = </a:t>
+            </a:r>
+            <a:r>
+              <a:rPr lang="en-GB" sz="1600" dirty="0" err="1"/>
+              <a:t>Kd</a:t>
+            </a:r>
+            <a:r>
+              <a:rPr lang="en-GB" sz="1600" dirty="0"/>
+              <a:t> * </a:t>
+            </a:r>
+            <a:r>
+              <a:rPr lang="en-GB" sz="1600" dirty="0" err="1"/>
+              <a:t>fLambert</a:t>
+            </a:r>
+            <a:r>
+              <a:rPr lang="en-GB" sz="1600" dirty="0"/>
+              <a:t> + Ks * </a:t>
+            </a:r>
+            <a:r>
+              <a:rPr lang="en-GB" sz="1600" dirty="0" err="1"/>
+              <a:t>fCook</a:t>
+            </a:r>
+            <a:r>
+              <a:rPr lang="en-GB" sz="1600" dirty="0"/>
+              <a:t>-Torrance.</a:t>
             </a:r>
           </a:p>
           <a:p>
             <a:pPr lvl="1"/>
             <a:r>
-              <a:rPr lang="en-GB" sz="1800" dirty="0"/>
-              <a:t>Specular: Light gets reflected.</a:t>
-            </a:r>
-          </a:p>
-          <a:p>
-            <a:pPr marL="457200" lvl="1" indent="0">
-              <a:buNone/>
-            </a:pPr>
-            <a:endParaRPr lang="en-GB" sz="2000" dirty="0"/>
+              <a:rPr lang="en-GB" sz="1600" dirty="0" err="1"/>
+              <a:t>fLambert</a:t>
+            </a:r>
+            <a:r>
+              <a:rPr lang="en-GB" sz="1600" dirty="0"/>
+              <a:t> is the diffusion part.</a:t>
+            </a:r>
+          </a:p>
+          <a:p>
+            <a:pPr lvl="1"/>
+            <a:r>
+              <a:rPr lang="en-GB" sz="1600" dirty="0" err="1"/>
+              <a:t>fCook</a:t>
+            </a:r>
+            <a:r>
+              <a:rPr lang="en-GB" sz="1600" dirty="0"/>
+              <a:t>-Torrance is the specular part.</a:t>
+            </a:r>
           </a:p>
         </p:txBody>
       </p:sp>
@@ -3800,47 +3873,6 @@
           </a:p>
         </p:txBody>
       </p:sp>
-      <p:pic>
-        <p:nvPicPr>
-          <p:cNvPr id="5" name="Picture 4" descr="Yellow-Specular, Blue-Diffuse">
-            <a:extLst>
-              <a:ext uri="{FF2B5EF4-FFF2-40B4-BE49-F238E27FC236}">
-                <a16:creationId xmlns:a16="http://schemas.microsoft.com/office/drawing/2014/main" id="{53B5CF99-3942-F362-A4CA-73D273245125}"/>
-              </a:ext>
-            </a:extLst>
-          </p:cNvPr>
-          <p:cNvPicPr>
-            <a:picLocks noChangeAspect="1"/>
-          </p:cNvPicPr>
-          <p:nvPr/>
-        </p:nvPicPr>
-        <p:blipFill>
-          <a:blip r:embed="rId2">
-            <a:extLst>
-              <a:ext uri="{28A0092B-C50C-407E-A947-70E740481C1C}">
-                <a14:useLocalDpi xmlns:a14="http://schemas.microsoft.com/office/drawing/2010/main" val="0"/>
-              </a:ext>
-            </a:extLst>
-          </a:blip>
-          <a:srcRect/>
-          <a:stretch>
-            <a:fillRect/>
-          </a:stretch>
-        </p:blipFill>
-        <p:spPr bwMode="auto">
-          <a:xfrm>
-            <a:off x="3533775" y="4581208"/>
-            <a:ext cx="5124450" cy="1595755"/>
-          </a:xfrm>
-          <a:prstGeom prst="rect">
-            <a:avLst/>
-          </a:prstGeom>
-          <a:noFill/>
-          <a:ln>
-            <a:noFill/>
-          </a:ln>
-        </p:spPr>
-      </p:pic>
     </p:spTree>
     <p:extLst>
       <p:ext uri="{BB962C8B-B14F-4D97-AF65-F5344CB8AC3E}">

</xml_diff>

<commit_message>
Add - Implementation changes
</commit_message>
<xml_diff>
--- a/Docs/Advanced Graphics – Physically Based Rendering.pptx
+++ b/Docs/Advanced Graphics – Physically Based Rendering.pptx
@@ -3929,6 +3929,53 @@
           <a:bodyPr/>
           <a:lstStyle/>
           <a:p>
+            <a:r>
+              <a:rPr lang="en-GB" dirty="0"/>
+              <a:t>Using NCLGL framework as a base.</a:t>
+            </a:r>
+          </a:p>
+          <a:p>
+            <a:r>
+              <a:rPr lang="en-GB" dirty="0"/>
+              <a:t>Dear ImGui framework for debugging and tweaking values at runtime.</a:t>
+            </a:r>
+          </a:p>
+          <a:p>
+            <a:r>
+              <a:rPr lang="en-GB" dirty="0"/>
+              <a:t>Different BRDFs were made for comparison:</a:t>
+            </a:r>
+          </a:p>
+          <a:p>
+            <a:pPr lvl="1"/>
+            <a:r>
+              <a:rPr lang="en-GB" dirty="0"/>
+              <a:t>PBR Cook-Torrance</a:t>
+            </a:r>
+          </a:p>
+          <a:p>
+            <a:pPr lvl="1"/>
+            <a:r>
+              <a:rPr lang="en-GB" dirty="0"/>
+              <a:t>PBR Disney</a:t>
+            </a:r>
+          </a:p>
+          <a:p>
+            <a:pPr lvl="1"/>
+            <a:r>
+              <a:rPr lang="en-GB" dirty="0"/>
+              <a:t>Blinn-Phong</a:t>
+            </a:r>
+          </a:p>
+          <a:p>
+            <a:pPr lvl="1"/>
+            <a:r>
+              <a:rPr lang="en-GB"/>
+              <a:t>Oren-Nayar</a:t>
+            </a:r>
+            <a:endParaRPr lang="en-GB" dirty="0"/>
+          </a:p>
+          <a:p>
             <a:endParaRPr lang="en-GB" dirty="0"/>
           </a:p>
         </p:txBody>

</xml_diff>

<commit_message>
Add - PPT Changes and Screenshots
</commit_message>
<xml_diff>
--- a/Docs/Advanced Graphics – Physically Based Rendering.pptx
+++ b/Docs/Advanced Graphics – Physically Based Rendering.pptx
@@ -9,6 +9,9 @@
     <p:sldId id="257" r:id="rId3"/>
     <p:sldId id="258" r:id="rId4"/>
     <p:sldId id="259" r:id="rId5"/>
+    <p:sldId id="260" r:id="rId6"/>
+    <p:sldId id="261" r:id="rId7"/>
+    <p:sldId id="262" r:id="rId8"/>
   </p:sldIdLst>
   <p:sldSz cx="12192000" cy="6858000"/>
   <p:notesSz cx="6858000" cy="9144000"/>
@@ -107,6 +110,11 @@
       </a:defRPr>
     </a:lvl9pPr>
   </p:defaultTextStyle>
+  <p:extLst>
+    <p:ext uri="{EFAFB233-063F-42B5-8137-9DF3F51BA10A}">
+      <p15:sldGuideLst xmlns:p15="http://schemas.microsoft.com/office/powerpoint/2012/main"/>
+    </p:ext>
+  </p:extLst>
 </p:presentation>
 </file>
 
@@ -259,7 +267,7 @@
           <a:p>
             <a:fld id="{7026AAE9-71E8-4A77-A8DA-C6ABC23EBA51}" type="datetimeFigureOut">
               <a:rPr lang="en-GB" smtClean="0"/>
-              <a:t>08/08/2023</a:t>
+              <a:t>09/08/2023</a:t>
             </a:fld>
             <a:endParaRPr lang="en-GB"/>
           </a:p>
@@ -459,7 +467,7 @@
           <a:p>
             <a:fld id="{7026AAE9-71E8-4A77-A8DA-C6ABC23EBA51}" type="datetimeFigureOut">
               <a:rPr lang="en-GB" smtClean="0"/>
-              <a:t>08/08/2023</a:t>
+              <a:t>09/08/2023</a:t>
             </a:fld>
             <a:endParaRPr lang="en-GB"/>
           </a:p>
@@ -669,7 +677,7 @@
           <a:p>
             <a:fld id="{7026AAE9-71E8-4A77-A8DA-C6ABC23EBA51}" type="datetimeFigureOut">
               <a:rPr lang="en-GB" smtClean="0"/>
-              <a:t>08/08/2023</a:t>
+              <a:t>09/08/2023</a:t>
             </a:fld>
             <a:endParaRPr lang="en-GB"/>
           </a:p>
@@ -869,7 +877,7 @@
           <a:p>
             <a:fld id="{7026AAE9-71E8-4A77-A8DA-C6ABC23EBA51}" type="datetimeFigureOut">
               <a:rPr lang="en-GB" smtClean="0"/>
-              <a:t>08/08/2023</a:t>
+              <a:t>09/08/2023</a:t>
             </a:fld>
             <a:endParaRPr lang="en-GB"/>
           </a:p>
@@ -1145,7 +1153,7 @@
           <a:p>
             <a:fld id="{7026AAE9-71E8-4A77-A8DA-C6ABC23EBA51}" type="datetimeFigureOut">
               <a:rPr lang="en-GB" smtClean="0"/>
-              <a:t>08/08/2023</a:t>
+              <a:t>09/08/2023</a:t>
             </a:fld>
             <a:endParaRPr lang="en-GB"/>
           </a:p>
@@ -1413,7 +1421,7 @@
           <a:p>
             <a:fld id="{7026AAE9-71E8-4A77-A8DA-C6ABC23EBA51}" type="datetimeFigureOut">
               <a:rPr lang="en-GB" smtClean="0"/>
-              <a:t>08/08/2023</a:t>
+              <a:t>09/08/2023</a:t>
             </a:fld>
             <a:endParaRPr lang="en-GB"/>
           </a:p>
@@ -1828,7 +1836,7 @@
           <a:p>
             <a:fld id="{7026AAE9-71E8-4A77-A8DA-C6ABC23EBA51}" type="datetimeFigureOut">
               <a:rPr lang="en-GB" smtClean="0"/>
-              <a:t>08/08/2023</a:t>
+              <a:t>09/08/2023</a:t>
             </a:fld>
             <a:endParaRPr lang="en-GB"/>
           </a:p>
@@ -1970,7 +1978,7 @@
           <a:p>
             <a:fld id="{7026AAE9-71E8-4A77-A8DA-C6ABC23EBA51}" type="datetimeFigureOut">
               <a:rPr lang="en-GB" smtClean="0"/>
-              <a:t>08/08/2023</a:t>
+              <a:t>09/08/2023</a:t>
             </a:fld>
             <a:endParaRPr lang="en-GB"/>
           </a:p>
@@ -2083,7 +2091,7 @@
           <a:p>
             <a:fld id="{7026AAE9-71E8-4A77-A8DA-C6ABC23EBA51}" type="datetimeFigureOut">
               <a:rPr lang="en-GB" smtClean="0"/>
-              <a:t>08/08/2023</a:t>
+              <a:t>09/08/2023</a:t>
             </a:fld>
             <a:endParaRPr lang="en-GB"/>
           </a:p>
@@ -2396,7 +2404,7 @@
           <a:p>
             <a:fld id="{7026AAE9-71E8-4A77-A8DA-C6ABC23EBA51}" type="datetimeFigureOut">
               <a:rPr lang="en-GB" smtClean="0"/>
-              <a:t>08/08/2023</a:t>
+              <a:t>09/08/2023</a:t>
             </a:fld>
             <a:endParaRPr lang="en-GB"/>
           </a:p>
@@ -2685,7 +2693,7 @@
           <a:p>
             <a:fld id="{7026AAE9-71E8-4A77-A8DA-C6ABC23EBA51}" type="datetimeFigureOut">
               <a:rPr lang="en-GB" smtClean="0"/>
-              <a:t>08/08/2023</a:t>
+              <a:t>09/08/2023</a:t>
             </a:fld>
             <a:endParaRPr lang="en-GB"/>
           </a:p>
@@ -2928,7 +2936,7 @@
           <a:p>
             <a:fld id="{7026AAE9-71E8-4A77-A8DA-C6ABC23EBA51}" type="datetimeFigureOut">
               <a:rPr lang="en-GB" smtClean="0"/>
-              <a:t>08/08/2023</a:t>
+              <a:t>09/08/2023</a:t>
             </a:fld>
             <a:endParaRPr lang="en-GB"/>
           </a:p>
@@ -3367,9 +3375,10 @@
           <a:lstStyle/>
           <a:p>
             <a:r>
-              <a:rPr lang="en-GB" dirty="0"/>
+              <a:rPr lang="en-GB"/>
               <a:t>Advanced Graphics – Physically Based Rendering</a:t>
             </a:r>
+            <a:endParaRPr lang="en-GB" dirty="0"/>
           </a:p>
         </p:txBody>
       </p:sp>
@@ -3402,33 +3411,34 @@
           <a:lstStyle/>
           <a:p>
             <a:r>
-              <a:rPr lang="en-GB" dirty="0"/>
+              <a:rPr lang="en-GB"/>
               <a:t>Jainesh Pathak</a:t>
             </a:r>
           </a:p>
           <a:p>
             <a:r>
-              <a:rPr lang="en-GB" dirty="0"/>
+              <a:rPr lang="en-GB"/>
               <a:t>June 2023</a:t>
             </a:r>
           </a:p>
           <a:p>
             <a:r>
-              <a:rPr lang="en-GB" dirty="0"/>
+              <a:rPr lang="en-GB"/>
               <a:t>School of Computing Science</a:t>
             </a:r>
           </a:p>
           <a:p>
             <a:r>
-              <a:rPr lang="en-GB" dirty="0"/>
+              <a:rPr lang="en-GB"/>
               <a:t>Newcastle University</a:t>
             </a:r>
           </a:p>
           <a:p>
             <a:r>
-              <a:rPr lang="en-GB" dirty="0"/>
+              <a:rPr lang="en-GB"/>
               <a:t>J.P.Pathak2@newcastle.ac.uk</a:t>
             </a:r>
+            <a:endParaRPr lang="en-GB" dirty="0"/>
           </a:p>
         </p:txBody>
       </p:sp>
@@ -3489,9 +3499,10 @@
           <a:lstStyle/>
           <a:p>
             <a:r>
-              <a:rPr lang="en-GB" dirty="0"/>
+              <a:rPr lang="en-GB"/>
               <a:t>Background</a:t>
             </a:r>
+            <a:endParaRPr lang="en-GB" dirty="0"/>
           </a:p>
         </p:txBody>
       </p:sp>
@@ -3524,97 +3535,97 @@
           <a:lstStyle/>
           <a:p>
             <a:r>
-              <a:rPr lang="en-GB" sz="2000" dirty="0"/>
+              <a:rPr lang="en-GB" sz="2000"/>
               <a:t>Lighting plays an important role to bring realism in computer graphics.</a:t>
             </a:r>
           </a:p>
           <a:p>
             <a:r>
-              <a:rPr lang="en-GB" sz="2000" dirty="0"/>
+              <a:rPr lang="en-GB" sz="2000"/>
               <a:t>2.5D games like Doom introduced “Sector-based” lighting and “Light Diminishing”:</a:t>
             </a:r>
           </a:p>
           <a:p>
             <a:pPr lvl="1"/>
             <a:r>
-              <a:rPr lang="en-GB" sz="1800" dirty="0"/>
+              <a:rPr lang="en-GB" sz="1800"/>
               <a:t>Sector-Based Lighting:</a:t>
             </a:r>
           </a:p>
           <a:p>
             <a:pPr lvl="2"/>
             <a:r>
-              <a:rPr lang="en-GB" sz="1400" dirty="0"/>
+              <a:rPr lang="en-GB" sz="1400"/>
               <a:t>Game level is divided into sectors. Every sector had a light level with range 0-255. 0 being complete dark and 255 being very bright.</a:t>
             </a:r>
           </a:p>
           <a:p>
             <a:pPr lvl="2"/>
             <a:r>
-              <a:rPr lang="en-GB" sz="1400" dirty="0"/>
+              <a:rPr lang="en-GB" sz="1400"/>
               <a:t>Light Attenuation were done where light levels of neighbour sectors gradually decreases to show light is traveling over distance.</a:t>
             </a:r>
           </a:p>
           <a:p>
             <a:pPr lvl="1"/>
             <a:r>
-              <a:rPr lang="en-GB" sz="1800" dirty="0"/>
+              <a:rPr lang="en-GB" sz="1800"/>
               <a:t>Light Diminishing</a:t>
             </a:r>
             <a:r>
-              <a:rPr lang="en-GB" sz="2000" dirty="0"/>
+              <a:rPr lang="en-GB" sz="2000"/>
               <a:t>:</a:t>
             </a:r>
           </a:p>
           <a:p>
             <a:pPr lvl="2"/>
             <a:r>
-              <a:rPr lang="en-GB" sz="1600" dirty="0"/>
+              <a:rPr lang="en-GB" sz="1600"/>
               <a:t>Sector area from player’s point of view is bright enough for player to see and slowly decreases as the distance between area and player increases. Also used in simulating fog.</a:t>
             </a:r>
           </a:p>
           <a:p>
             <a:r>
-              <a:rPr lang="en-GB" sz="2000" dirty="0"/>
+              <a:rPr lang="en-GB" sz="2000"/>
               <a:t>As GPUs progressed, lighting and overall video game graphics also progressed.</a:t>
             </a:r>
           </a:p>
           <a:p>
             <a:r>
-              <a:rPr lang="en-GB" sz="2000" dirty="0"/>
+              <a:rPr lang="en-GB" sz="2000"/>
               <a:t>3D Games like Unreal, Doom 3 showcased more dynamic lighting with different light sources: Point, Directional, Spot Lights.</a:t>
             </a:r>
           </a:p>
           <a:p>
             <a:r>
-              <a:rPr lang="en-GB" sz="2000" dirty="0"/>
+              <a:rPr lang="en-GB" sz="2000"/>
               <a:t>Blinn-Phong light model became widely popular and used in computer graphics.</a:t>
             </a:r>
           </a:p>
           <a:p>
             <a:pPr lvl="1"/>
             <a:r>
-              <a:rPr lang="en-GB" sz="1600" dirty="0"/>
+              <a:rPr lang="en-GB" sz="1600"/>
               <a:t>Uses sum of three components: Ambient, Diffuse and Specular.</a:t>
             </a:r>
           </a:p>
           <a:p>
             <a:r>
-              <a:rPr lang="en-GB" sz="2000" dirty="0"/>
+              <a:rPr lang="en-GB" sz="2000"/>
               <a:t>Blinn-Phong light model disadvantages:</a:t>
             </a:r>
           </a:p>
           <a:p>
             <a:pPr lvl="1"/>
             <a:r>
-              <a:rPr lang="en-GB" sz="1600" dirty="0"/>
+              <a:rPr lang="en-GB" sz="1600"/>
               <a:t>Violates conservation of energy law. Energy is lost as specular intensity is increased.</a:t>
             </a:r>
           </a:p>
           <a:p>
             <a:pPr lvl="1"/>
             <a:r>
-              <a:rPr lang="en-GB" sz="1600" dirty="0"/>
+              <a:rPr lang="en-GB" sz="1600"/>
               <a:t>Doesn’t take the metallic and roughness surface properties on a microfacet level in account.</a:t>
             </a:r>
             <a:endParaRPr lang="en-GB" sz="2000" dirty="0"/>
@@ -3755,7 +3766,7 @@
             <a:pPr lvl="1"/>
             <a:r>
               <a:rPr lang="en-GB" sz="1600" dirty="0"/>
-              <a:t>It approximates how much light ray gets reflected based on the surface properties</a:t>
+              <a:t>It approximates how much light ray gets reflected based on the surface properties.</a:t>
             </a:r>
           </a:p>
           <a:p>
@@ -3867,12 +3878,54 @@
           </a:lstStyle>
           <a:p>
             <a:r>
-              <a:rPr lang="en-GB" dirty="0"/>
+              <a:rPr lang="en-GB"/>
               <a:t>Introduction</a:t>
             </a:r>
-          </a:p>
-        </p:txBody>
-      </p:sp>
+            <a:endParaRPr lang="en-GB" dirty="0"/>
+          </a:p>
+        </p:txBody>
+      </p:sp>
+      <p:pic>
+        <p:nvPicPr>
+          <p:cNvPr id="2" name="Picture 1" descr="Yellow-Specular, Blue-Diffuse">
+            <a:extLst>
+              <a:ext uri="{FF2B5EF4-FFF2-40B4-BE49-F238E27FC236}">
+                <a16:creationId xmlns:a16="http://schemas.microsoft.com/office/drawing/2014/main" id="{055785EB-10AD-CB9E-3D32-BEF21D0F0157}"/>
+              </a:ext>
+            </a:extLst>
+          </p:cNvPr>
+          <p:cNvPicPr>
+            <a:picLocks noChangeAspect="1"/>
+          </p:cNvPicPr>
+          <p:nvPr/>
+        </p:nvPicPr>
+        <p:blipFill>
+          <a:blip r:embed="rId2">
+            <a:extLst>
+              <a:ext uri="{28A0092B-C50C-407E-A947-70E740481C1C}">
+                <a14:useLocalDpi xmlns:a14="http://schemas.microsoft.com/office/drawing/2010/main" val="0"/>
+              </a:ext>
+            </a:extLst>
+          </a:blip>
+          <a:srcRect/>
+          <a:stretch>
+            <a:fillRect/>
+          </a:stretch>
+        </p:blipFill>
+        <p:spPr bwMode="auto">
+          <a:xfrm>
+            <a:off x="7468469" y="4619625"/>
+            <a:ext cx="3885331" cy="1557338"/>
+          </a:xfrm>
+          <a:prstGeom prst="rect">
+            <a:avLst/>
+          </a:prstGeom>
+          <a:noFill/>
+          <a:ln>
+            <a:noFill/>
+          </a:ln>
+        </p:spPr>
+      </p:pic>
     </p:spTree>
     <p:extLst>
       <p:ext uri="{BB962C8B-B14F-4D97-AF65-F5344CB8AC3E}">
@@ -3889,6 +3942,14 @@
 <file path=ppt/slides/slide4.xml><?xml version="1.0" encoding="utf-8"?>
 <p:sld xmlns:a="http://schemas.openxmlformats.org/drawingml/2006/main" xmlns:r="http://schemas.openxmlformats.org/officeDocument/2006/relationships" xmlns:p="http://schemas.openxmlformats.org/presentationml/2006/main">
   <p:cSld>
+    <p:bg>
+      <p:bgPr>
+        <a:solidFill>
+          <a:schemeClr val="bg1"/>
+        </a:solidFill>
+        <a:effectLst/>
+      </p:bgPr>
+    </p:bg>
     <p:spTree>
       <p:nvGrpSpPr>
         <p:cNvPr id="1" name=""/>
@@ -3905,10 +3966,377 @@
       </p:grpSpPr>
       <p:sp>
         <p:nvSpPr>
+          <p:cNvPr id="4" name="Title 1">
+            <a:extLst>
+              <a:ext uri="{FF2B5EF4-FFF2-40B4-BE49-F238E27FC236}">
+                <a16:creationId xmlns:a16="http://schemas.microsoft.com/office/drawing/2014/main" id="{AFDC5BA9-88AF-7883-95A2-6D0517E4AA35}"/>
+              </a:ext>
+            </a:extLst>
+          </p:cNvPr>
+          <p:cNvSpPr txBox="1">
+            <a:spLocks/>
+          </p:cNvSpPr>
+          <p:nvPr/>
+        </p:nvSpPr>
+        <p:spPr>
+          <a:xfrm>
+            <a:off x="542956" y="741391"/>
+            <a:ext cx="4116589" cy="562115"/>
+          </a:xfrm>
+          <a:prstGeom prst="rect">
+            <a:avLst/>
+          </a:prstGeom>
+        </p:spPr>
+        <p:txBody>
+          <a:bodyPr vert="horz" lIns="91440" tIns="45720" rIns="91440" bIns="45720" rtlCol="0" anchor="b">
+            <a:normAutofit/>
+          </a:bodyPr>
+          <a:lstStyle>
+            <a:lvl1pPr algn="l" defTabSz="914400" rtl="0" eaLnBrk="1" latinLnBrk="0" hangingPunct="1">
+              <a:lnSpc>
+                <a:spcPct val="90000"/>
+              </a:lnSpc>
+              <a:spcBef>
+                <a:spcPct val="0"/>
+              </a:spcBef>
+              <a:buNone/>
+              <a:defRPr sz="4400" kern="1200">
+                <a:solidFill>
+                  <a:schemeClr val="tx1"/>
+                </a:solidFill>
+                <a:latin typeface="+mj-lt"/>
+                <a:ea typeface="+mj-ea"/>
+                <a:cs typeface="+mj-cs"/>
+              </a:defRPr>
+            </a:lvl1pPr>
+          </a:lstStyle>
+          <a:p>
+            <a:pPr>
+              <a:spcAft>
+                <a:spcPts val="600"/>
+              </a:spcAft>
+            </a:pPr>
+            <a:r>
+              <a:rPr lang="en-US" sz="3200" kern="1200">
+                <a:solidFill>
+                  <a:schemeClr val="tx1"/>
+                </a:solidFill>
+                <a:latin typeface="+mj-lt"/>
+                <a:ea typeface="+mj-ea"/>
+                <a:cs typeface="+mj-cs"/>
+              </a:rPr>
+              <a:t>Implementations</a:t>
+            </a:r>
+            <a:endParaRPr lang="en-US" sz="3200" kern="1200" dirty="0">
+              <a:solidFill>
+                <a:schemeClr val="tx1"/>
+              </a:solidFill>
+              <a:latin typeface="+mj-lt"/>
+              <a:ea typeface="+mj-ea"/>
+              <a:cs typeface="+mj-cs"/>
+            </a:endParaRPr>
+          </a:p>
+        </p:txBody>
+      </p:sp>
+      <p:sp>
+        <p:nvSpPr>
           <p:cNvPr id="3" name="Content Placeholder 2">
             <a:extLst>
               <a:ext uri="{FF2B5EF4-FFF2-40B4-BE49-F238E27FC236}">
                 <a16:creationId xmlns:a16="http://schemas.microsoft.com/office/drawing/2014/main" id="{C9B0730D-F15A-F521-081E-81D1014694B3}"/>
+              </a:ext>
+            </a:extLst>
+          </p:cNvPr>
+          <p:cNvSpPr>
+            <a:spLocks noGrp="1"/>
+          </p:cNvSpPr>
+          <p:nvPr>
+            <p:ph idx="1"/>
+          </p:nvPr>
+        </p:nvSpPr>
+        <p:spPr>
+          <a:xfrm>
+            <a:off x="542959" y="1303506"/>
+            <a:ext cx="4116590" cy="4677802"/>
+          </a:xfrm>
+        </p:spPr>
+        <p:txBody>
+          <a:bodyPr vert="horz" lIns="91440" tIns="45720" rIns="91440" bIns="45720" rtlCol="0" anchor="t">
+            <a:normAutofit fontScale="92500"/>
+          </a:bodyPr>
+          <a:lstStyle/>
+          <a:p>
+            <a:r>
+              <a:rPr lang="en-US" sz="1600"/>
+              <a:t>Using OpenGL and NCLGL framework as a base.</a:t>
+            </a:r>
+          </a:p>
+          <a:p>
+            <a:r>
+              <a:rPr lang="en-US" sz="1600"/>
+              <a:t>Dear ImGui framework for debugging, tweaking parameters at runtime and profiling.</a:t>
+            </a:r>
+          </a:p>
+          <a:p>
+            <a:r>
+              <a:rPr lang="en-US" sz="1600"/>
+              <a:t>Different types of BRDFs are made for comparison:</a:t>
+            </a:r>
+          </a:p>
+          <a:p>
+            <a:pPr lvl="1"/>
+            <a:r>
+              <a:rPr lang="en-US" sz="1600"/>
+              <a:t>PBR Cook-Torrance</a:t>
+            </a:r>
+          </a:p>
+          <a:p>
+            <a:pPr lvl="1"/>
+            <a:r>
+              <a:rPr lang="en-US" sz="1600"/>
+              <a:t>PBR Disney</a:t>
+            </a:r>
+          </a:p>
+          <a:p>
+            <a:pPr lvl="1"/>
+            <a:r>
+              <a:rPr lang="en-US" sz="1600"/>
+              <a:t>Blinn-Phong</a:t>
+            </a:r>
+          </a:p>
+          <a:p>
+            <a:pPr lvl="1"/>
+            <a:r>
+              <a:rPr lang="en-US" sz="1600"/>
+              <a:t>Oren-Nayar + Beckmann/GGX/Gaussian</a:t>
+            </a:r>
+          </a:p>
+          <a:p>
+            <a:r>
+              <a:rPr lang="en-US" sz="1600"/>
+              <a:t>Post Processing Effects:</a:t>
+            </a:r>
+          </a:p>
+          <a:p>
+            <a:pPr lvl="1"/>
+            <a:r>
+              <a:rPr lang="en-US" sz="1600"/>
+              <a:t>Bloom</a:t>
+            </a:r>
+          </a:p>
+          <a:p>
+            <a:pPr lvl="1"/>
+            <a:r>
+              <a:rPr lang="en-US" sz="1600"/>
+              <a:t>Vignette</a:t>
+            </a:r>
+          </a:p>
+          <a:p>
+            <a:pPr lvl="1"/>
+            <a:r>
+              <a:rPr lang="en-US" sz="1600"/>
+              <a:t>SSAO</a:t>
+            </a:r>
+          </a:p>
+          <a:p>
+            <a:pPr lvl="1"/>
+            <a:r>
+              <a:rPr lang="en-US" sz="1600"/>
+              <a:t>Invert Colour</a:t>
+            </a:r>
+          </a:p>
+          <a:p>
+            <a:r>
+              <a:rPr lang="en-US" sz="1600"/>
+              <a:t>Gamma Correction and Tone Mapping:</a:t>
+            </a:r>
+          </a:p>
+          <a:p>
+            <a:pPr lvl="1"/>
+            <a:r>
+              <a:rPr lang="en-US" sz="1600"/>
+              <a:t>Reinhard Tone Mapping</a:t>
+            </a:r>
+            <a:endParaRPr lang="en-US" sz="1600" dirty="0"/>
+          </a:p>
+        </p:txBody>
+      </p:sp>
+      <p:pic>
+        <p:nvPicPr>
+          <p:cNvPr id="40" name="Picture 39" descr="A car on a road&#10;&#10;Description automatically generated">
+            <a:extLst>
+              <a:ext uri="{FF2B5EF4-FFF2-40B4-BE49-F238E27FC236}">
+                <a16:creationId xmlns:a16="http://schemas.microsoft.com/office/drawing/2014/main" id="{A6607C7B-670B-CEB3-68A3-91CBB81EA9E1}"/>
+              </a:ext>
+            </a:extLst>
+          </p:cNvPr>
+          <p:cNvPicPr>
+            <a:picLocks noChangeAspect="1"/>
+          </p:cNvPicPr>
+          <p:nvPr/>
+        </p:nvPicPr>
+        <p:blipFill rotWithShape="1">
+          <a:blip r:embed="rId2">
+            <a:extLst>
+              <a:ext uri="{28A0092B-C50C-407E-A947-70E740481C1C}">
+                <a14:useLocalDpi xmlns:a14="http://schemas.microsoft.com/office/drawing/2010/main" val="0"/>
+              </a:ext>
+            </a:extLst>
+          </a:blip>
+          <a:srcRect t="482" r="-4" b="-4"/>
+          <a:stretch/>
+        </p:blipFill>
+        <p:spPr>
+          <a:xfrm>
+            <a:off x="5056572" y="910201"/>
+            <a:ext cx="3375533" cy="2447560"/>
+          </a:xfrm>
+          <a:prstGeom prst="rect">
+            <a:avLst/>
+          </a:prstGeom>
+        </p:spPr>
+      </p:pic>
+      <p:pic>
+        <p:nvPicPr>
+          <p:cNvPr id="38" name="Picture 37" descr="A car on a road&#10;&#10;Description automatically generated">
+            <a:extLst>
+              <a:ext uri="{FF2B5EF4-FFF2-40B4-BE49-F238E27FC236}">
+                <a16:creationId xmlns:a16="http://schemas.microsoft.com/office/drawing/2014/main" id="{19932867-277E-437D-D6EE-B9B45F77B2AF}"/>
+              </a:ext>
+            </a:extLst>
+          </p:cNvPr>
+          <p:cNvPicPr>
+            <a:picLocks noChangeAspect="1"/>
+          </p:cNvPicPr>
+          <p:nvPr/>
+        </p:nvPicPr>
+        <p:blipFill rotWithShape="1">
+          <a:blip r:embed="rId3">
+            <a:extLst>
+              <a:ext uri="{28A0092B-C50C-407E-A947-70E740481C1C}">
+                <a14:useLocalDpi xmlns:a14="http://schemas.microsoft.com/office/drawing/2010/main" val="0"/>
+              </a:ext>
+            </a:extLst>
+          </a:blip>
+          <a:srcRect t="482" r="-4" b="-4"/>
+          <a:stretch/>
+        </p:blipFill>
+        <p:spPr>
+          <a:xfrm>
+            <a:off x="8610917" y="909562"/>
+            <a:ext cx="3279822" cy="2448000"/>
+          </a:xfrm>
+          <a:prstGeom prst="rect">
+            <a:avLst/>
+          </a:prstGeom>
+        </p:spPr>
+      </p:pic>
+      <p:pic>
+        <p:nvPicPr>
+          <p:cNvPr id="44" name="Picture 43" descr="A car on a road&#10;&#10;Description automatically generated">
+            <a:extLst>
+              <a:ext uri="{FF2B5EF4-FFF2-40B4-BE49-F238E27FC236}">
+                <a16:creationId xmlns:a16="http://schemas.microsoft.com/office/drawing/2014/main" id="{14E86187-E7BF-5A0D-0A5B-536A165AFEC1}"/>
+              </a:ext>
+            </a:extLst>
+          </p:cNvPr>
+          <p:cNvPicPr>
+            <a:picLocks noChangeAspect="1"/>
+          </p:cNvPicPr>
+          <p:nvPr/>
+        </p:nvPicPr>
+        <p:blipFill rotWithShape="1">
+          <a:blip r:embed="rId4">
+            <a:extLst>
+              <a:ext uri="{28A0092B-C50C-407E-A947-70E740481C1C}">
+                <a14:useLocalDpi xmlns:a14="http://schemas.microsoft.com/office/drawing/2010/main" val="0"/>
+              </a:ext>
+            </a:extLst>
+          </a:blip>
+          <a:srcRect t="482" r="-4" b="-4"/>
+          <a:stretch/>
+        </p:blipFill>
+        <p:spPr>
+          <a:xfrm>
+            <a:off x="8610918" y="3500239"/>
+            <a:ext cx="3277442" cy="2448000"/>
+          </a:xfrm>
+          <a:prstGeom prst="rect">
+            <a:avLst/>
+          </a:prstGeom>
+        </p:spPr>
+      </p:pic>
+      <p:pic>
+        <p:nvPicPr>
+          <p:cNvPr id="42" name="Picture 41" descr="A red car on a road&#10;&#10;Description automatically generated">
+            <a:extLst>
+              <a:ext uri="{FF2B5EF4-FFF2-40B4-BE49-F238E27FC236}">
+                <a16:creationId xmlns:a16="http://schemas.microsoft.com/office/drawing/2014/main" id="{F8FF68E0-8EFA-9E2A-F71D-B4294A3F5385}"/>
+              </a:ext>
+            </a:extLst>
+          </p:cNvPr>
+          <p:cNvPicPr>
+            <a:picLocks noChangeAspect="1"/>
+          </p:cNvPicPr>
+          <p:nvPr/>
+        </p:nvPicPr>
+        <p:blipFill rotWithShape="1">
+          <a:blip r:embed="rId5">
+            <a:extLst>
+              <a:ext uri="{28A0092B-C50C-407E-A947-70E740481C1C}">
+                <a14:useLocalDpi xmlns:a14="http://schemas.microsoft.com/office/drawing/2010/main" val="0"/>
+              </a:ext>
+            </a:extLst>
+          </a:blip>
+          <a:srcRect t="3276"/>
+          <a:stretch/>
+        </p:blipFill>
+        <p:spPr>
+          <a:xfrm>
+            <a:off x="5056573" y="3500240"/>
+            <a:ext cx="3374543" cy="2448000"/>
+          </a:xfrm>
+          <a:prstGeom prst="rect">
+            <a:avLst/>
+          </a:prstGeom>
+        </p:spPr>
+      </p:pic>
+    </p:spTree>
+    <p:extLst>
+      <p:ext uri="{BB962C8B-B14F-4D97-AF65-F5344CB8AC3E}">
+        <p14:creationId xmlns:p14="http://schemas.microsoft.com/office/powerpoint/2010/main" val="3295761997"/>
+      </p:ext>
+    </p:extLst>
+  </p:cSld>
+  <p:clrMapOvr>
+    <a:masterClrMapping/>
+  </p:clrMapOvr>
+</p:sld>
+</file>
+
+<file path=ppt/slides/slide5.xml><?xml version="1.0" encoding="utf-8"?>
+<p:sld xmlns:a="http://schemas.openxmlformats.org/drawingml/2006/main" xmlns:r="http://schemas.openxmlformats.org/officeDocument/2006/relationships" xmlns:p="http://schemas.openxmlformats.org/presentationml/2006/main">
+  <p:cSld>
+    <p:spTree>
+      <p:nvGrpSpPr>
+        <p:cNvPr id="1" name=""/>
+        <p:cNvGrpSpPr/>
+        <p:nvPr/>
+      </p:nvGrpSpPr>
+      <p:grpSpPr>
+        <a:xfrm>
+          <a:off x="0" y="0"/>
+          <a:ext cx="0" cy="0"/>
+          <a:chOff x="0" y="0"/>
+          <a:chExt cx="0" cy="0"/>
+        </a:xfrm>
+      </p:grpSpPr>
+      <p:sp>
+        <p:nvSpPr>
+          <p:cNvPr id="3" name="Content Placeholder 2">
+            <a:extLst>
+              <a:ext uri="{FF2B5EF4-FFF2-40B4-BE49-F238E27FC236}">
+                <a16:creationId xmlns:a16="http://schemas.microsoft.com/office/drawing/2014/main" id="{D5AB975D-9286-9A32-9B7A-4D43C873046B}"/>
               </a:ext>
             </a:extLst>
           </p:cNvPr>
@@ -3926,57 +4354,132 @@
           </a:xfrm>
         </p:spPr>
         <p:txBody>
-          <a:bodyPr/>
-          <a:lstStyle/>
-          <a:p>
-            <a:r>
-              <a:rPr lang="en-GB" dirty="0"/>
-              <a:t>Using NCLGL framework as a base.</a:t>
-            </a:r>
-          </a:p>
-          <a:p>
-            <a:r>
-              <a:rPr lang="en-GB" dirty="0"/>
-              <a:t>Dear ImGui framework for debugging and tweaking values at runtime.</a:t>
-            </a:r>
-          </a:p>
-          <a:p>
-            <a:r>
-              <a:rPr lang="en-GB" dirty="0"/>
-              <a:t>Different BRDFs were made for comparison:</a:t>
-            </a:r>
-          </a:p>
-          <a:p>
-            <a:pPr lvl="1"/>
-            <a:r>
-              <a:rPr lang="en-GB" dirty="0"/>
-              <a:t>PBR Cook-Torrance</a:t>
-            </a:r>
-          </a:p>
-          <a:p>
-            <a:pPr lvl="1"/>
-            <a:r>
-              <a:rPr lang="en-GB" dirty="0"/>
-              <a:t>PBR Disney</a:t>
-            </a:r>
-          </a:p>
-          <a:p>
-            <a:pPr lvl="1"/>
-            <a:r>
-              <a:rPr lang="en-GB" dirty="0"/>
-              <a:t>Blinn-Phong</a:t>
-            </a:r>
-          </a:p>
-          <a:p>
-            <a:pPr lvl="1"/>
-            <a:r>
-              <a:rPr lang="en-GB"/>
-              <a:t>Oren-Nayar</a:t>
-            </a:r>
-            <a:endParaRPr lang="en-GB" dirty="0"/>
-          </a:p>
-          <a:p>
-            <a:endParaRPr lang="en-GB" dirty="0"/>
+          <a:bodyPr>
+            <a:normAutofit lnSpcReduction="10000"/>
+          </a:bodyPr>
+          <a:lstStyle/>
+          <a:p>
+            <a:r>
+              <a:rPr lang="en-GB" sz="2000" dirty="0"/>
+              <a:t>Image-based Lighting (IBL):</a:t>
+            </a:r>
+          </a:p>
+          <a:p>
+            <a:pPr lvl="1"/>
+            <a:r>
+              <a:rPr lang="en-GB" sz="1600" dirty="0"/>
+              <a:t>Using HDR textures to convert to </a:t>
+            </a:r>
+            <a:r>
+              <a:rPr lang="en-GB" sz="1600" dirty="0" err="1"/>
+              <a:t>Cubemaps</a:t>
+            </a:r>
+            <a:r>
+              <a:rPr lang="en-GB" sz="1600" dirty="0"/>
+              <a:t>. </a:t>
+            </a:r>
+          </a:p>
+          <a:p>
+            <a:pPr lvl="1"/>
+            <a:r>
+              <a:rPr lang="en-GB" sz="1600" dirty="0"/>
+              <a:t>Exposure controllable from ImGui</a:t>
+            </a:r>
+          </a:p>
+          <a:p>
+            <a:pPr lvl="1"/>
+            <a:r>
+              <a:rPr lang="en-GB" sz="1600" dirty="0"/>
+              <a:t>Five different types of skybox used to show ambient lighting on surfaces</a:t>
+            </a:r>
+          </a:p>
+          <a:p>
+            <a:pPr lvl="1"/>
+            <a:r>
+              <a:rPr lang="en-GB" sz="1600" dirty="0"/>
+              <a:t>Diffuse Irradiance</a:t>
+            </a:r>
+          </a:p>
+          <a:p>
+            <a:pPr lvl="1"/>
+            <a:r>
+              <a:rPr lang="en-GB" sz="1600" dirty="0"/>
+              <a:t>Specular Prefiltering and Lookup table</a:t>
+            </a:r>
+          </a:p>
+          <a:p>
+            <a:r>
+              <a:rPr lang="en-GB" sz="2000" dirty="0"/>
+              <a:t>For PBR, different textures are being used:</a:t>
+            </a:r>
+          </a:p>
+          <a:p>
+            <a:pPr lvl="1"/>
+            <a:r>
+              <a:rPr lang="en-GB" sz="1600" dirty="0"/>
+              <a:t>Albedo: Base colour</a:t>
+            </a:r>
+          </a:p>
+          <a:p>
+            <a:pPr lvl="1"/>
+            <a:r>
+              <a:rPr lang="en-GB" sz="1600" dirty="0"/>
+              <a:t>Normal: Surface details</a:t>
+            </a:r>
+          </a:p>
+          <a:p>
+            <a:pPr lvl="1"/>
+            <a:r>
+              <a:rPr lang="en-GB" sz="1600" dirty="0"/>
+              <a:t>Metallic: Metallic or Dielectric</a:t>
+            </a:r>
+          </a:p>
+          <a:p>
+            <a:pPr lvl="1"/>
+            <a:r>
+              <a:rPr lang="en-GB" sz="1600" dirty="0"/>
+              <a:t>Roughness: Controls the smoothness</a:t>
+            </a:r>
+          </a:p>
+          <a:p>
+            <a:pPr lvl="1"/>
+            <a:r>
+              <a:rPr lang="en-GB" sz="1600" dirty="0"/>
+              <a:t>Emission: Emitting light from surface</a:t>
+            </a:r>
+          </a:p>
+          <a:p>
+            <a:pPr lvl="1"/>
+            <a:r>
+              <a:rPr lang="en-GB" sz="1600" dirty="0"/>
+              <a:t>Ambient Occlusion: Enhances shading</a:t>
+            </a:r>
+          </a:p>
+          <a:p>
+            <a:r>
+              <a:rPr lang="en-GB" sz="2000" dirty="0"/>
+              <a:t>Lights:</a:t>
+            </a:r>
+          </a:p>
+          <a:p>
+            <a:pPr lvl="1"/>
+            <a:r>
+              <a:rPr lang="en-GB" sz="1600" dirty="0"/>
+              <a:t>Billboard effect to show different types of light sources.</a:t>
+            </a:r>
+          </a:p>
+          <a:p>
+            <a:r>
+              <a:rPr lang="en-GB" sz="2000" dirty="0"/>
+              <a:t>Material System:</a:t>
+            </a:r>
+          </a:p>
+          <a:p>
+            <a:pPr lvl="1"/>
+            <a:r>
+              <a:rPr lang="en-GB" sz="1600" dirty="0"/>
+              <a:t>Basic material system which applies to who mesh instead of sub-meshes.</a:t>
+            </a:r>
           </a:p>
         </p:txBody>
       </p:sp>
@@ -3985,7 +4488,7 @@
           <p:cNvPr id="4" name="Title 1">
             <a:extLst>
               <a:ext uri="{FF2B5EF4-FFF2-40B4-BE49-F238E27FC236}">
-                <a16:creationId xmlns:a16="http://schemas.microsoft.com/office/drawing/2014/main" id="{AFDC5BA9-88AF-7883-95A2-6D0517E4AA35}"/>
+                <a16:creationId xmlns:a16="http://schemas.microsoft.com/office/drawing/2014/main" id="{B74402A1-9925-7592-4E04-BEA3C6BB17B9}"/>
               </a:ext>
             </a:extLst>
           </p:cNvPr>
@@ -4028,16 +4531,363 @@
           </a:lstStyle>
           <a:p>
             <a:r>
-              <a:rPr lang="en-GB" dirty="0"/>
-              <a:t>Implementation and Challenges</a:t>
-            </a:r>
+              <a:rPr lang="en-GB"/>
+              <a:t>Implementations</a:t>
+            </a:r>
+            <a:endParaRPr lang="en-GB" dirty="0"/>
           </a:p>
         </p:txBody>
       </p:sp>
     </p:spTree>
     <p:extLst>
       <p:ext uri="{BB962C8B-B14F-4D97-AF65-F5344CB8AC3E}">
-        <p14:creationId xmlns:p14="http://schemas.microsoft.com/office/powerpoint/2010/main" val="3295761997"/>
+        <p14:creationId xmlns:p14="http://schemas.microsoft.com/office/powerpoint/2010/main" val="1351730714"/>
+      </p:ext>
+    </p:extLst>
+  </p:cSld>
+  <p:clrMapOvr>
+    <a:masterClrMapping/>
+  </p:clrMapOvr>
+</p:sld>
+</file>
+
+<file path=ppt/slides/slide6.xml><?xml version="1.0" encoding="utf-8"?>
+<p:sld xmlns:a="http://schemas.openxmlformats.org/drawingml/2006/main" xmlns:r="http://schemas.openxmlformats.org/officeDocument/2006/relationships" xmlns:p="http://schemas.openxmlformats.org/presentationml/2006/main">
+  <p:cSld>
+    <p:spTree>
+      <p:nvGrpSpPr>
+        <p:cNvPr id="1" name=""/>
+        <p:cNvGrpSpPr/>
+        <p:nvPr/>
+      </p:nvGrpSpPr>
+      <p:grpSpPr>
+        <a:xfrm>
+          <a:off x="0" y="0"/>
+          <a:ext cx="0" cy="0"/>
+          <a:chOff x="0" y="0"/>
+          <a:chExt cx="0" cy="0"/>
+        </a:xfrm>
+      </p:grpSpPr>
+      <p:sp>
+        <p:nvSpPr>
+          <p:cNvPr id="3" name="Content Placeholder 2">
+            <a:extLst>
+              <a:ext uri="{FF2B5EF4-FFF2-40B4-BE49-F238E27FC236}">
+                <a16:creationId xmlns:a16="http://schemas.microsoft.com/office/drawing/2014/main" id="{3A542F1D-3950-C7DB-5E7A-29F7C0A37D71}"/>
+              </a:ext>
+            </a:extLst>
+          </p:cNvPr>
+          <p:cNvSpPr>
+            <a:spLocks noGrp="1"/>
+          </p:cNvSpPr>
+          <p:nvPr>
+            <p:ph idx="1"/>
+          </p:nvPr>
+        </p:nvSpPr>
+        <p:spPr>
+          <a:xfrm>
+            <a:off x="838200" y="1104900"/>
+            <a:ext cx="10515600" cy="5072063"/>
+          </a:xfrm>
+        </p:spPr>
+        <p:txBody>
+          <a:bodyPr>
+            <a:normAutofit lnSpcReduction="10000"/>
+          </a:bodyPr>
+          <a:lstStyle/>
+          <a:p>
+            <a:r>
+              <a:rPr lang="en-GB" sz="2000" dirty="0"/>
+              <a:t>Lights Performance:</a:t>
+            </a:r>
+          </a:p>
+          <a:p>
+            <a:pPr lvl="1"/>
+            <a:r>
+              <a:rPr lang="en-GB" sz="1600" dirty="0"/>
+              <a:t>Sending light attributes to every frame is heavy on performance.</a:t>
+            </a:r>
+          </a:p>
+          <a:p>
+            <a:pPr lvl="1"/>
+            <a:r>
+              <a:rPr lang="en-GB" sz="1600" dirty="0"/>
+              <a:t>To counter this, Uniform Buffer Objects (UBO) are used.</a:t>
+            </a:r>
+          </a:p>
+          <a:p>
+            <a:pPr lvl="1"/>
+            <a:r>
+              <a:rPr lang="en-GB" sz="1600" dirty="0"/>
+              <a:t>OpenGL version 4.20 is used for easy setting the binding points of UBOs</a:t>
+            </a:r>
+          </a:p>
+          <a:p>
+            <a:pPr lvl="1"/>
+            <a:r>
+              <a:rPr lang="en-GB" sz="1600" dirty="0"/>
+              <a:t>Light attributes are stored in a struct and datatype of Vector4 are used for memory alignment and padding precisions.</a:t>
+            </a:r>
+          </a:p>
+          <a:p>
+            <a:pPr lvl="1"/>
+            <a:r>
+              <a:rPr lang="en-GB" sz="1600" dirty="0"/>
+              <a:t>Lights UBO Data are not sent every frame. Instead, they are sent when there is a change in any of the light attributes when using ImGui.</a:t>
+            </a:r>
+          </a:p>
+          <a:p>
+            <a:r>
+              <a:rPr lang="en-GB" sz="2000" dirty="0"/>
+              <a:t>Uniform Buffer Objects:</a:t>
+            </a:r>
+          </a:p>
+          <a:p>
+            <a:pPr lvl="1"/>
+            <a:r>
+              <a:rPr lang="en-GB" sz="1600" dirty="0"/>
+              <a:t>Also used to store the view projection matrix.</a:t>
+            </a:r>
+          </a:p>
+          <a:p>
+            <a:pPr lvl="1"/>
+            <a:r>
+              <a:rPr lang="en-GB" sz="1600" dirty="0"/>
+              <a:t>Skybox light data like Gamma and Exposure intensity.</a:t>
+            </a:r>
+          </a:p>
+          <a:p>
+            <a:r>
+              <a:rPr lang="en-GB" sz="2000" dirty="0"/>
+              <a:t>Texture Loading Time:</a:t>
+            </a:r>
+          </a:p>
+          <a:p>
+            <a:pPr lvl="1"/>
+            <a:r>
+              <a:rPr lang="en-GB" sz="1600" dirty="0"/>
+              <a:t>PBR Textures are quite heavy to load due to size of resolutions.</a:t>
+            </a:r>
+          </a:p>
+          <a:p>
+            <a:pPr lvl="1"/>
+            <a:r>
+              <a:rPr lang="en-GB" sz="1600" dirty="0"/>
+              <a:t>Loading the textures in main thread is not effective.</a:t>
+            </a:r>
+          </a:p>
+          <a:p>
+            <a:pPr lvl="1"/>
+            <a:r>
+              <a:rPr lang="en-GB" sz="1600" dirty="0"/>
+              <a:t>To solve this, Multi-threading is used.</a:t>
+            </a:r>
+          </a:p>
+          <a:p>
+            <a:pPr lvl="1"/>
+            <a:r>
+              <a:rPr lang="en-GB" sz="1600" dirty="0"/>
+              <a:t>The texture’s raw data are loaded using threads and once loaded the usual OpenGL texture objects are created loaded with raw data.</a:t>
+            </a:r>
+          </a:p>
+          <a:p>
+            <a:pPr lvl="1"/>
+            <a:r>
+              <a:rPr lang="en-GB" sz="1600" dirty="0"/>
+              <a:t>This reduced the loading time from 17 seconds to 7-8 seconds.</a:t>
+            </a:r>
+          </a:p>
+        </p:txBody>
+      </p:sp>
+      <p:sp>
+        <p:nvSpPr>
+          <p:cNvPr id="5" name="Title 1">
+            <a:extLst>
+              <a:ext uri="{FF2B5EF4-FFF2-40B4-BE49-F238E27FC236}">
+                <a16:creationId xmlns:a16="http://schemas.microsoft.com/office/drawing/2014/main" id="{0804A275-B03D-5692-937E-D95E9F2575B1}"/>
+              </a:ext>
+            </a:extLst>
+          </p:cNvPr>
+          <p:cNvSpPr txBox="1">
+            <a:spLocks/>
+          </p:cNvSpPr>
+          <p:nvPr/>
+        </p:nvSpPr>
+        <p:spPr>
+          <a:xfrm>
+            <a:off x="838200" y="365125"/>
+            <a:ext cx="10515600" cy="739775"/>
+          </a:xfrm>
+          <a:prstGeom prst="rect">
+            <a:avLst/>
+          </a:prstGeom>
+        </p:spPr>
+        <p:txBody>
+          <a:bodyPr vert="horz" lIns="91440" tIns="45720" rIns="91440" bIns="45720" rtlCol="0" anchor="ctr">
+            <a:normAutofit/>
+          </a:bodyPr>
+          <a:lstStyle>
+            <a:lvl1pPr algn="l" defTabSz="914400" rtl="0" eaLnBrk="1" latinLnBrk="0" hangingPunct="1">
+              <a:lnSpc>
+                <a:spcPct val="90000"/>
+              </a:lnSpc>
+              <a:spcBef>
+                <a:spcPct val="0"/>
+              </a:spcBef>
+              <a:buNone/>
+              <a:defRPr sz="4400" kern="1200">
+                <a:solidFill>
+                  <a:schemeClr val="tx1"/>
+                </a:solidFill>
+                <a:latin typeface="+mj-lt"/>
+                <a:ea typeface="+mj-ea"/>
+                <a:cs typeface="+mj-cs"/>
+              </a:defRPr>
+            </a:lvl1pPr>
+          </a:lstStyle>
+          <a:p>
+            <a:r>
+              <a:rPr lang="en-GB" dirty="0"/>
+              <a:t>Challenges</a:t>
+            </a:r>
+          </a:p>
+        </p:txBody>
+      </p:sp>
+    </p:spTree>
+    <p:extLst>
+      <p:ext uri="{BB962C8B-B14F-4D97-AF65-F5344CB8AC3E}">
+        <p14:creationId xmlns:p14="http://schemas.microsoft.com/office/powerpoint/2010/main" val="1652487588"/>
+      </p:ext>
+    </p:extLst>
+  </p:cSld>
+  <p:clrMapOvr>
+    <a:masterClrMapping/>
+  </p:clrMapOvr>
+</p:sld>
+</file>
+
+<file path=ppt/slides/slide7.xml><?xml version="1.0" encoding="utf-8"?>
+<p:sld xmlns:a="http://schemas.openxmlformats.org/drawingml/2006/main" xmlns:r="http://schemas.openxmlformats.org/officeDocument/2006/relationships" xmlns:p="http://schemas.openxmlformats.org/presentationml/2006/main">
+  <p:cSld>
+    <p:spTree>
+      <p:nvGrpSpPr>
+        <p:cNvPr id="1" name=""/>
+        <p:cNvGrpSpPr/>
+        <p:nvPr/>
+      </p:nvGrpSpPr>
+      <p:grpSpPr>
+        <a:xfrm>
+          <a:off x="0" y="0"/>
+          <a:ext cx="0" cy="0"/>
+          <a:chOff x="0" y="0"/>
+          <a:chExt cx="0" cy="0"/>
+        </a:xfrm>
+      </p:grpSpPr>
+      <p:sp>
+        <p:nvSpPr>
+          <p:cNvPr id="3" name="Content Placeholder 2">
+            <a:extLst>
+              <a:ext uri="{FF2B5EF4-FFF2-40B4-BE49-F238E27FC236}">
+                <a16:creationId xmlns:a16="http://schemas.microsoft.com/office/drawing/2014/main" id="{656D6BAC-9108-8B90-C8A2-D4DAFF570A69}"/>
+              </a:ext>
+            </a:extLst>
+          </p:cNvPr>
+          <p:cNvSpPr>
+            <a:spLocks noGrp="1"/>
+          </p:cNvSpPr>
+          <p:nvPr>
+            <p:ph idx="1"/>
+          </p:nvPr>
+        </p:nvSpPr>
+        <p:spPr>
+          <a:xfrm>
+            <a:off x="838200" y="1104900"/>
+            <a:ext cx="10515600" cy="5072063"/>
+          </a:xfrm>
+        </p:spPr>
+        <p:txBody>
+          <a:bodyPr>
+            <a:normAutofit/>
+          </a:bodyPr>
+          <a:lstStyle/>
+          <a:p>
+            <a:r>
+              <a:rPr lang="en-GB" sz="2000" dirty="0"/>
+              <a:t>Using UBO for lights and loading texture raw data using threads significantly improved the performance and loading time.</a:t>
+            </a:r>
+          </a:p>
+          <a:p>
+            <a:r>
+              <a:rPr lang="en-GB" sz="2000" dirty="0"/>
+              <a:t>Frames Per Second (FPS) stayed at a stable 60 FPS with V-Sync on and approximately 300 </a:t>
+            </a:r>
+            <a:r>
+              <a:rPr lang="en-GB" sz="2000"/>
+              <a:t>FPS when V-Sync is off.</a:t>
+            </a:r>
+            <a:endParaRPr lang="en-GB" sz="2000" dirty="0"/>
+          </a:p>
+        </p:txBody>
+      </p:sp>
+      <p:sp>
+        <p:nvSpPr>
+          <p:cNvPr id="6" name="Title 1">
+            <a:extLst>
+              <a:ext uri="{FF2B5EF4-FFF2-40B4-BE49-F238E27FC236}">
+                <a16:creationId xmlns:a16="http://schemas.microsoft.com/office/drawing/2014/main" id="{128C9563-A501-9A4F-BE24-B15EA57B8505}"/>
+              </a:ext>
+            </a:extLst>
+          </p:cNvPr>
+          <p:cNvSpPr txBox="1">
+            <a:spLocks/>
+          </p:cNvSpPr>
+          <p:nvPr/>
+        </p:nvSpPr>
+        <p:spPr>
+          <a:xfrm>
+            <a:off x="838200" y="365125"/>
+            <a:ext cx="10515600" cy="739775"/>
+          </a:xfrm>
+          <a:prstGeom prst="rect">
+            <a:avLst/>
+          </a:prstGeom>
+        </p:spPr>
+        <p:txBody>
+          <a:bodyPr vert="horz" lIns="91440" tIns="45720" rIns="91440" bIns="45720" rtlCol="0" anchor="ctr">
+            <a:normAutofit/>
+          </a:bodyPr>
+          <a:lstStyle>
+            <a:lvl1pPr algn="l" defTabSz="914400" rtl="0" eaLnBrk="1" latinLnBrk="0" hangingPunct="1">
+              <a:lnSpc>
+                <a:spcPct val="90000"/>
+              </a:lnSpc>
+              <a:spcBef>
+                <a:spcPct val="0"/>
+              </a:spcBef>
+              <a:buNone/>
+              <a:defRPr sz="4400" kern="1200">
+                <a:solidFill>
+                  <a:schemeClr val="tx1"/>
+                </a:solidFill>
+                <a:latin typeface="+mj-lt"/>
+                <a:ea typeface="+mj-ea"/>
+                <a:cs typeface="+mj-cs"/>
+              </a:defRPr>
+            </a:lvl1pPr>
+          </a:lstStyle>
+          <a:p>
+            <a:r>
+              <a:rPr lang="en-GB"/>
+              <a:t>Analysis</a:t>
+            </a:r>
+            <a:endParaRPr lang="en-GB" dirty="0"/>
+          </a:p>
+        </p:txBody>
+      </p:sp>
+    </p:spTree>
+    <p:extLst>
+      <p:ext uri="{BB962C8B-B14F-4D97-AF65-F5344CB8AC3E}">
+        <p14:creationId xmlns:p14="http://schemas.microsoft.com/office/powerpoint/2010/main" val="4029633785"/>
       </p:ext>
     </p:extLst>
   </p:cSld>

</xml_diff>